<commit_message>
Aggiornata presentazione power point - versione definitiva
</commit_message>
<xml_diff>
--- a/Ferrari-Pavone-Pederzoli.pptx
+++ b/Ferrari-Pavone-Pederzoli.pptx
@@ -5,7 +5,7 @@
     <p:sldMasterId id="2147483659" r:id="rId3"/>
   </p:sldMasterIdLst>
   <p:notesMasterIdLst>
-    <p:notesMasterId r:id="rId20"/>
+    <p:notesMasterId r:id="rId21"/>
   </p:notesMasterIdLst>
   <p:sldIdLst>
     <p:sldId id="265" r:id="rId4"/>
@@ -16,14 +16,15 @@
     <p:sldId id="260" r:id="rId9"/>
     <p:sldId id="261" r:id="rId10"/>
     <p:sldId id="273" r:id="rId11"/>
-    <p:sldId id="262" r:id="rId12"/>
-    <p:sldId id="274" r:id="rId13"/>
-    <p:sldId id="263" r:id="rId14"/>
-    <p:sldId id="275" r:id="rId15"/>
-    <p:sldId id="264" r:id="rId16"/>
-    <p:sldId id="268" r:id="rId17"/>
-    <p:sldId id="272" r:id="rId18"/>
-    <p:sldId id="267" r:id="rId19"/>
+    <p:sldId id="276" r:id="rId12"/>
+    <p:sldId id="262" r:id="rId13"/>
+    <p:sldId id="274" r:id="rId14"/>
+    <p:sldId id="263" r:id="rId15"/>
+    <p:sldId id="275" r:id="rId16"/>
+    <p:sldId id="264" r:id="rId17"/>
+    <p:sldId id="268" r:id="rId18"/>
+    <p:sldId id="272" r:id="rId19"/>
+    <p:sldId id="267" r:id="rId20"/>
   </p:sldIdLst>
   <p:sldSz cx="9144000" cy="5143500" type="screen16x9"/>
   <p:notesSz cx="6858000" cy="9144000"/>
@@ -861,7 +862,7 @@
   <p:cSld>
     <p:spTree>
       <p:nvGrpSpPr>
-        <p:cNvPr id="1" name="Shape 99"/>
+        <p:cNvPr id="1" name="Shape 93"/>
         <p:cNvGrpSpPr/>
         <p:nvPr/>
       </p:nvGrpSpPr>
@@ -875,7 +876,7 @@
       </p:grpSpPr>
       <p:sp>
         <p:nvSpPr>
-          <p:cNvPr id="100" name="Google Shape;100;g2acc6557978_0_27:notes"/>
+          <p:cNvPr id="94" name="Google Shape;94;g2acc6557978_0_22:notes"/>
           <p:cNvSpPr>
             <a:spLocks noGrp="1" noRot="1" noChangeAspect="1"/>
           </p:cNvSpPr>
@@ -916,7 +917,7 @@
       </p:sp>
       <p:sp>
         <p:nvSpPr>
-          <p:cNvPr id="101" name="Google Shape;101;g2acc6557978_0_27:notes"/>
+          <p:cNvPr id="95" name="Google Shape;95;g2acc6557978_0_22:notes"/>
           <p:cNvSpPr txBox="1">
             <a:spLocks noGrp="1"/>
           </p:cNvSpPr>
@@ -953,6 +954,11 @@
         </p:txBody>
       </p:sp>
     </p:spTree>
+    <p:extLst>
+      <p:ext uri="{BB962C8B-B14F-4D97-AF65-F5344CB8AC3E}">
+        <p14:creationId xmlns:p14="http://schemas.microsoft.com/office/powerpoint/2010/main" val="2364824481"/>
+      </p:ext>
+    </p:extLst>
   </p:cSld>
   <p:clrMapOvr>
     <a:masterClrMapping/>
@@ -1057,6 +1063,110 @@
         </p:txBody>
       </p:sp>
     </p:spTree>
+  </p:cSld>
+  <p:clrMapOvr>
+    <a:masterClrMapping/>
+  </p:clrMapOvr>
+</p:notes>
+</file>
+
+<file path=ppt/notesSlides/notesSlide12.xml><?xml version="1.0" encoding="utf-8"?>
+<p:notes xmlns:a="http://schemas.openxmlformats.org/drawingml/2006/main" xmlns:r="http://schemas.openxmlformats.org/officeDocument/2006/relationships" xmlns:p="http://schemas.openxmlformats.org/presentationml/2006/main" showMasterSp="0" showMasterPhAnim="0">
+  <p:cSld>
+    <p:spTree>
+      <p:nvGrpSpPr>
+        <p:cNvPr id="1" name="Shape 99"/>
+        <p:cNvGrpSpPr/>
+        <p:nvPr/>
+      </p:nvGrpSpPr>
+      <p:grpSpPr>
+        <a:xfrm>
+          <a:off x="0" y="0"/>
+          <a:ext cx="0" cy="0"/>
+          <a:chOff x="0" y="0"/>
+          <a:chExt cx="0" cy="0"/>
+        </a:xfrm>
+      </p:grpSpPr>
+      <p:sp>
+        <p:nvSpPr>
+          <p:cNvPr id="100" name="Google Shape;100;g2acc6557978_0_27:notes"/>
+          <p:cNvSpPr>
+            <a:spLocks noGrp="1" noRot="1" noChangeAspect="1"/>
+          </p:cNvSpPr>
+          <p:nvPr>
+            <p:ph type="sldImg" idx="2"/>
+          </p:nvPr>
+        </p:nvSpPr>
+        <p:spPr>
+          <a:xfrm>
+            <a:off x="381000" y="685800"/>
+            <a:ext cx="6096000" cy="3429000"/>
+          </a:xfrm>
+          <a:custGeom>
+            <a:avLst/>
+            <a:gdLst/>
+            <a:ahLst/>
+            <a:cxnLst/>
+            <a:rect l="l" t="t" r="r" b="b"/>
+            <a:pathLst>
+              <a:path w="120000" h="120000" extrusionOk="0">
+                <a:moveTo>
+                  <a:pt x="0" y="0"/>
+                </a:moveTo>
+                <a:lnTo>
+                  <a:pt x="120000" y="0"/>
+                </a:lnTo>
+                <a:lnTo>
+                  <a:pt x="120000" y="120000"/>
+                </a:lnTo>
+                <a:lnTo>
+                  <a:pt x="0" y="120000"/>
+                </a:lnTo>
+                <a:close/>
+              </a:path>
+            </a:pathLst>
+          </a:custGeom>
+        </p:spPr>
+      </p:sp>
+      <p:sp>
+        <p:nvSpPr>
+          <p:cNvPr id="101" name="Google Shape;101;g2acc6557978_0_27:notes"/>
+          <p:cNvSpPr txBox="1">
+            <a:spLocks noGrp="1"/>
+          </p:cNvSpPr>
+          <p:nvPr>
+            <p:ph type="body" idx="1"/>
+          </p:nvPr>
+        </p:nvSpPr>
+        <p:spPr>
+          <a:xfrm>
+            <a:off x="685800" y="4343400"/>
+            <a:ext cx="5486400" cy="4114800"/>
+          </a:xfrm>
+          <a:prstGeom prst="rect">
+            <a:avLst/>
+          </a:prstGeom>
+        </p:spPr>
+        <p:txBody>
+          <a:bodyPr spcFirstLastPara="1" wrap="square" lIns="91425" tIns="91425" rIns="91425" bIns="91425" anchor="t" anchorCtr="0">
+            <a:noAutofit/>
+          </a:bodyPr>
+          <a:lstStyle/>
+          <a:p>
+            <a:pPr marL="0" lvl="0" indent="0" algn="l" rtl="0">
+              <a:spcBef>
+                <a:spcPts val="0"/>
+              </a:spcBef>
+              <a:spcAft>
+                <a:spcPts val="0"/>
+              </a:spcAft>
+              <a:buNone/>
+            </a:pPr>
+            <a:endParaRPr/>
+          </a:p>
+        </p:txBody>
+      </p:sp>
+    </p:spTree>
     <p:extLst>
       <p:ext uri="{BB962C8B-B14F-4D97-AF65-F5344CB8AC3E}">
         <p14:creationId xmlns:p14="http://schemas.microsoft.com/office/powerpoint/2010/main" val="3405541254"/>
@@ -1069,7 +1179,7 @@
 </p:notes>
 </file>
 
-<file path=ppt/notesSlides/notesSlide12.xml><?xml version="1.0" encoding="utf-8"?>
+<file path=ppt/notesSlides/notesSlide13.xml><?xml version="1.0" encoding="utf-8"?>
 <p:notes xmlns:a="http://schemas.openxmlformats.org/drawingml/2006/main" xmlns:r="http://schemas.openxmlformats.org/officeDocument/2006/relationships" xmlns:p="http://schemas.openxmlformats.org/presentationml/2006/main" showMasterSp="0" showMasterPhAnim="0">
   <p:cSld>
     <p:spTree>
@@ -1807,7 +1917,7 @@
   <p:cSld>
     <p:spTree>
       <p:nvGrpSpPr>
-        <p:cNvPr id="1" name="Shape 93"/>
+        <p:cNvPr id="1" name="Shape 87"/>
         <p:cNvGrpSpPr/>
         <p:nvPr/>
       </p:nvGrpSpPr>
@@ -1821,7 +1931,7 @@
       </p:grpSpPr>
       <p:sp>
         <p:nvSpPr>
-          <p:cNvPr id="94" name="Google Shape;94;g2acc6557978_0_22:notes"/>
+          <p:cNvPr id="88" name="Google Shape;88;g2acc6557978_0_17:notes"/>
           <p:cNvSpPr>
             <a:spLocks noGrp="1" noRot="1" noChangeAspect="1"/>
           </p:cNvSpPr>
@@ -1862,7 +1972,7 @@
       </p:sp>
       <p:sp>
         <p:nvSpPr>
-          <p:cNvPr id="95" name="Google Shape;95;g2acc6557978_0_22:notes"/>
+          <p:cNvPr id="89" name="Google Shape;89;g2acc6557978_0_17:notes"/>
           <p:cNvSpPr txBox="1">
             <a:spLocks noGrp="1"/>
           </p:cNvSpPr>
@@ -1899,6 +2009,11 @@
         </p:txBody>
       </p:sp>
     </p:spTree>
+    <p:extLst>
+      <p:ext uri="{BB962C8B-B14F-4D97-AF65-F5344CB8AC3E}">
+        <p14:creationId xmlns:p14="http://schemas.microsoft.com/office/powerpoint/2010/main" val="1398685206"/>
+      </p:ext>
+    </p:extLst>
   </p:cSld>
   <p:clrMapOvr>
     <a:masterClrMapping/>
@@ -2003,11 +2118,6 @@
         </p:txBody>
       </p:sp>
     </p:spTree>
-    <p:extLst>
-      <p:ext uri="{BB962C8B-B14F-4D97-AF65-F5344CB8AC3E}">
-        <p14:creationId xmlns:p14="http://schemas.microsoft.com/office/powerpoint/2010/main" val="2364824481"/>
-      </p:ext>
-    </p:extLst>
   </p:cSld>
   <p:clrMapOvr>
     <a:masterClrMapping/>
@@ -6928,7 +7038,7 @@
         </p:nvSpPr>
         <p:spPr>
           <a:xfrm>
-            <a:off x="1411335" y="343424"/>
+            <a:off x="1411335" y="321121"/>
             <a:ext cx="6321329" cy="572700"/>
           </a:xfrm>
           <a:prstGeom prst="rect">
@@ -6941,7 +7051,210 @@
           </a:bodyPr>
           <a:lstStyle/>
           <a:p>
-            <a:pPr marL="0" lvl="0" indent="0" algn="l" rtl="0">
+            <a:pPr marL="0" lvl="0" indent="0" algn="ctr" rtl="0">
+              <a:spcBef>
+                <a:spcPts val="0"/>
+              </a:spcBef>
+              <a:spcAft>
+                <a:spcPts val="0"/>
+              </a:spcAft>
+              <a:buNone/>
+            </a:pPr>
+            <a:r>
+              <a:rPr lang="en-US" i="1" dirty="0"/>
+              <a:t>Description of results on Pipeline-Step</a:t>
+            </a:r>
+          </a:p>
+        </p:txBody>
+      </p:sp>
+      <p:pic>
+        <p:nvPicPr>
+          <p:cNvPr id="3" name="Immagine 2" descr="Immagine che contiene testo, schermata, Policromia&#10;&#10;Descrizione generata automaticamente">
+            <a:extLst>
+              <a:ext uri="{FF2B5EF4-FFF2-40B4-BE49-F238E27FC236}">
+                <a16:creationId xmlns:a16="http://schemas.microsoft.com/office/drawing/2014/main" id="{4CD9C2C5-DB11-4E07-5E48-B30FDC5D448C}"/>
+              </a:ext>
+            </a:extLst>
+          </p:cNvPr>
+          <p:cNvPicPr>
+            <a:picLocks noChangeAspect="1"/>
+          </p:cNvPicPr>
+          <p:nvPr/>
+        </p:nvPicPr>
+        <p:blipFill rotWithShape="1">
+          <a:blip r:embed="rId3"/>
+          <a:srcRect b="6023"/>
+          <a:stretch/>
+        </p:blipFill>
+        <p:spPr>
+          <a:xfrm>
+            <a:off x="1063171" y="1302063"/>
+            <a:ext cx="7017656" cy="3282577"/>
+          </a:xfrm>
+          <a:prstGeom prst="rect">
+            <a:avLst/>
+          </a:prstGeom>
+        </p:spPr>
+      </p:pic>
+      <p:sp>
+        <p:nvSpPr>
+          <p:cNvPr id="2" name="CasellaDiTesto 1">
+            <a:extLst>
+              <a:ext uri="{FF2B5EF4-FFF2-40B4-BE49-F238E27FC236}">
+                <a16:creationId xmlns:a16="http://schemas.microsoft.com/office/drawing/2014/main" id="{6D9D5308-DC38-05E2-A0BD-67F913CD4A60}"/>
+              </a:ext>
+            </a:extLst>
+          </p:cNvPr>
+          <p:cNvSpPr txBox="1"/>
+          <p:nvPr/>
+        </p:nvSpPr>
+        <p:spPr>
+          <a:xfrm>
+            <a:off x="1605775" y="994286"/>
+            <a:ext cx="2022088" cy="307777"/>
+          </a:xfrm>
+          <a:prstGeom prst="rect">
+            <a:avLst/>
+          </a:prstGeom>
+          <a:noFill/>
+        </p:spPr>
+        <p:txBody>
+          <a:bodyPr wrap="square" rtlCol="0">
+            <a:spAutoFit/>
+          </a:bodyPr>
+          <a:lstStyle/>
+          <a:p>
+            <a:pPr algn="ctr"/>
+            <a:r>
+              <a:rPr lang="it-IT" dirty="0"/>
+              <a:t>EDA</a:t>
+            </a:r>
+          </a:p>
+        </p:txBody>
+      </p:sp>
+      <p:sp>
+        <p:nvSpPr>
+          <p:cNvPr id="4" name="CasellaDiTesto 3">
+            <a:extLst>
+              <a:ext uri="{FF2B5EF4-FFF2-40B4-BE49-F238E27FC236}">
+                <a16:creationId xmlns:a16="http://schemas.microsoft.com/office/drawing/2014/main" id="{A57C0915-B6EF-1480-8C27-60A0C7774FB3}"/>
+              </a:ext>
+            </a:extLst>
+          </p:cNvPr>
+          <p:cNvSpPr txBox="1"/>
+          <p:nvPr/>
+        </p:nvSpPr>
+        <p:spPr>
+          <a:xfrm>
+            <a:off x="3828584" y="994286"/>
+            <a:ext cx="2022088" cy="307777"/>
+          </a:xfrm>
+          <a:prstGeom prst="rect">
+            <a:avLst/>
+          </a:prstGeom>
+          <a:noFill/>
+        </p:spPr>
+        <p:txBody>
+          <a:bodyPr wrap="square" rtlCol="0">
+            <a:spAutoFit/>
+          </a:bodyPr>
+          <a:lstStyle/>
+          <a:p>
+            <a:pPr algn="ctr"/>
+            <a:r>
+              <a:rPr lang="it-IT" dirty="0"/>
+              <a:t>DT</a:t>
+            </a:r>
+          </a:p>
+        </p:txBody>
+      </p:sp>
+      <p:sp>
+        <p:nvSpPr>
+          <p:cNvPr id="5" name="CasellaDiTesto 4">
+            <a:extLst>
+              <a:ext uri="{FF2B5EF4-FFF2-40B4-BE49-F238E27FC236}">
+                <a16:creationId xmlns:a16="http://schemas.microsoft.com/office/drawing/2014/main" id="{D84BF924-2A10-8998-A943-658CAF6AAEB6}"/>
+              </a:ext>
+            </a:extLst>
+          </p:cNvPr>
+          <p:cNvSpPr txBox="1"/>
+          <p:nvPr/>
+        </p:nvSpPr>
+        <p:spPr>
+          <a:xfrm>
+            <a:off x="5954705" y="994286"/>
+            <a:ext cx="2022088" cy="307777"/>
+          </a:xfrm>
+          <a:prstGeom prst="rect">
+            <a:avLst/>
+          </a:prstGeom>
+          <a:noFill/>
+        </p:spPr>
+        <p:txBody>
+          <a:bodyPr wrap="square" rtlCol="0">
+            <a:spAutoFit/>
+          </a:bodyPr>
+          <a:lstStyle/>
+          <a:p>
+            <a:pPr algn="ctr"/>
+            <a:r>
+              <a:rPr lang="it-IT" dirty="0"/>
+              <a:t>DC</a:t>
+            </a:r>
+          </a:p>
+        </p:txBody>
+      </p:sp>
+    </p:spTree>
+  </p:cSld>
+  <p:clrMapOvr>
+    <a:masterClrMapping/>
+  </p:clrMapOvr>
+</p:sld>
+</file>
+
+<file path=ppt/slides/slide11.xml><?xml version="1.0" encoding="utf-8"?>
+<p:sld xmlns:a="http://schemas.openxmlformats.org/drawingml/2006/main" xmlns:r="http://schemas.openxmlformats.org/officeDocument/2006/relationships" xmlns:p="http://schemas.openxmlformats.org/presentationml/2006/main">
+  <p:cSld>
+    <p:spTree>
+      <p:nvGrpSpPr>
+        <p:cNvPr id="1" name="Shape 96"/>
+        <p:cNvGrpSpPr/>
+        <p:nvPr/>
+      </p:nvGrpSpPr>
+      <p:grpSpPr>
+        <a:xfrm>
+          <a:off x="0" y="0"/>
+          <a:ext cx="0" cy="0"/>
+          <a:chOff x="0" y="0"/>
+          <a:chExt cx="0" cy="0"/>
+        </a:xfrm>
+      </p:grpSpPr>
+      <p:sp>
+        <p:nvSpPr>
+          <p:cNvPr id="97" name="Google Shape;97;p19"/>
+          <p:cNvSpPr txBox="1">
+            <a:spLocks noGrp="1"/>
+          </p:cNvSpPr>
+          <p:nvPr>
+            <p:ph type="title"/>
+          </p:nvPr>
+        </p:nvSpPr>
+        <p:spPr>
+          <a:xfrm>
+            <a:off x="1411335" y="367179"/>
+            <a:ext cx="6321329" cy="572700"/>
+          </a:xfrm>
+          <a:prstGeom prst="rect">
+            <a:avLst/>
+          </a:prstGeom>
+        </p:spPr>
+        <p:txBody>
+          <a:bodyPr spcFirstLastPara="1" wrap="square" lIns="91425" tIns="91425" rIns="91425" bIns="91425" anchor="t" anchorCtr="0">
+            <a:normAutofit fontScale="90000"/>
+          </a:bodyPr>
+          <a:lstStyle/>
+          <a:p>
+            <a:pPr marL="0" lvl="0" indent="0" algn="ctr" rtl="0">
               <a:spcBef>
                 <a:spcPts val="0"/>
               </a:spcBef>
@@ -6972,22 +7285,129 @@
           </p:cNvPicPr>
           <p:nvPr/>
         </p:nvPicPr>
-        <p:blipFill>
+        <p:blipFill rotWithShape="1">
           <a:blip r:embed="rId3"/>
-          <a:stretch>
-            <a:fillRect/>
-          </a:stretch>
+          <a:srcRect b="6023"/>
+          <a:stretch/>
         </p:blipFill>
         <p:spPr>
           <a:xfrm>
-            <a:off x="1060579" y="1082164"/>
-            <a:ext cx="7022839" cy="3492000"/>
+            <a:off x="1060580" y="1510962"/>
+            <a:ext cx="7022839" cy="3281680"/>
           </a:xfrm>
           <a:prstGeom prst="rect">
             <a:avLst/>
           </a:prstGeom>
         </p:spPr>
       </p:pic>
+      <p:sp>
+        <p:nvSpPr>
+          <p:cNvPr id="2" name="CasellaDiTesto 1">
+            <a:extLst>
+              <a:ext uri="{FF2B5EF4-FFF2-40B4-BE49-F238E27FC236}">
+                <a16:creationId xmlns:a16="http://schemas.microsoft.com/office/drawing/2014/main" id="{841CCDA2-9585-3335-7BBC-7D94926430AD}"/>
+              </a:ext>
+            </a:extLst>
+          </p:cNvPr>
+          <p:cNvSpPr txBox="1"/>
+          <p:nvPr/>
+        </p:nvSpPr>
+        <p:spPr>
+          <a:xfrm>
+            <a:off x="1605775" y="1203185"/>
+            <a:ext cx="2022088" cy="307777"/>
+          </a:xfrm>
+          <a:prstGeom prst="rect">
+            <a:avLst/>
+          </a:prstGeom>
+          <a:noFill/>
+        </p:spPr>
+        <p:txBody>
+          <a:bodyPr wrap="square" rtlCol="0">
+            <a:spAutoFit/>
+          </a:bodyPr>
+          <a:lstStyle/>
+          <a:p>
+            <a:pPr algn="ctr"/>
+            <a:r>
+              <a:rPr lang="it-IT" dirty="0"/>
+              <a:t>EDA</a:t>
+            </a:r>
+          </a:p>
+        </p:txBody>
+      </p:sp>
+      <p:sp>
+        <p:nvSpPr>
+          <p:cNvPr id="3" name="CasellaDiTesto 2">
+            <a:extLst>
+              <a:ext uri="{FF2B5EF4-FFF2-40B4-BE49-F238E27FC236}">
+                <a16:creationId xmlns:a16="http://schemas.microsoft.com/office/drawing/2014/main" id="{9290B24C-9DE2-286B-A411-E1BB388DC873}"/>
+              </a:ext>
+            </a:extLst>
+          </p:cNvPr>
+          <p:cNvSpPr txBox="1"/>
+          <p:nvPr/>
+        </p:nvSpPr>
+        <p:spPr>
+          <a:xfrm>
+            <a:off x="3828584" y="1203185"/>
+            <a:ext cx="2022088" cy="307777"/>
+          </a:xfrm>
+          <a:prstGeom prst="rect">
+            <a:avLst/>
+          </a:prstGeom>
+          <a:noFill/>
+        </p:spPr>
+        <p:txBody>
+          <a:bodyPr wrap="square" rtlCol="0">
+            <a:spAutoFit/>
+          </a:bodyPr>
+          <a:lstStyle/>
+          <a:p>
+            <a:pPr algn="ctr"/>
+            <a:r>
+              <a:rPr lang="it-IT" dirty="0"/>
+              <a:t>DT</a:t>
+            </a:r>
+          </a:p>
+        </p:txBody>
+      </p:sp>
+      <p:sp>
+        <p:nvSpPr>
+          <p:cNvPr id="5" name="CasellaDiTesto 4">
+            <a:extLst>
+              <a:ext uri="{FF2B5EF4-FFF2-40B4-BE49-F238E27FC236}">
+                <a16:creationId xmlns:a16="http://schemas.microsoft.com/office/drawing/2014/main" id="{C7474113-138F-97CC-681D-0543A344965B}"/>
+              </a:ext>
+            </a:extLst>
+          </p:cNvPr>
+          <p:cNvSpPr txBox="1"/>
+          <p:nvPr/>
+        </p:nvSpPr>
+        <p:spPr>
+          <a:xfrm>
+            <a:off x="5954705" y="1203185"/>
+            <a:ext cx="2022088" cy="307777"/>
+          </a:xfrm>
+          <a:prstGeom prst="rect">
+            <a:avLst/>
+          </a:prstGeom>
+          <a:noFill/>
+        </p:spPr>
+        <p:txBody>
+          <a:bodyPr wrap="square" rtlCol="0">
+            <a:spAutoFit/>
+          </a:bodyPr>
+          <a:lstStyle/>
+          <a:p>
+            <a:pPr algn="ctr"/>
+            <a:r>
+              <a:rPr lang="it-IT" dirty="0"/>
+              <a:t>DC</a:t>
+            </a:r>
+          </a:p>
+        </p:txBody>
+      </p:sp>
     </p:spTree>
     <p:extLst>
       <p:ext uri="{BB962C8B-B14F-4D97-AF65-F5344CB8AC3E}">
@@ -7001,7 +7421,7 @@
 </p:sld>
 </file>
 
-<file path=ppt/slides/slide11.xml><?xml version="1.0" encoding="utf-8"?>
+<file path=ppt/slides/slide12.xml><?xml version="1.0" encoding="utf-8"?>
 <p:sld xmlns:a="http://schemas.openxmlformats.org/drawingml/2006/main" xmlns:r="http://schemas.openxmlformats.org/officeDocument/2006/relationships" xmlns:p="http://schemas.openxmlformats.org/presentationml/2006/main">
   <p:cSld>
     <p:spTree>
@@ -7043,7 +7463,7 @@
           </a:bodyPr>
           <a:lstStyle/>
           <a:p>
-            <a:pPr marL="0" lvl="0" indent="0" algn="l" rtl="0">
+            <a:pPr marL="0" lvl="0" indent="0" algn="ctr" rtl="0">
               <a:spcBef>
                 <a:spcPts val="0"/>
               </a:spcBef>
@@ -7098,7 +7518,7 @@
 </p:sld>
 </file>
 
-<file path=ppt/slides/slide12.xml><?xml version="1.0" encoding="utf-8"?>
+<file path=ppt/slides/slide13.xml><?xml version="1.0" encoding="utf-8"?>
 <p:sld xmlns:a="http://schemas.openxmlformats.org/drawingml/2006/main" xmlns:r="http://schemas.openxmlformats.org/officeDocument/2006/relationships" xmlns:p="http://schemas.openxmlformats.org/presentationml/2006/main">
   <p:cSld>
     <p:spTree>
@@ -7140,7 +7560,7 @@
           </a:bodyPr>
           <a:lstStyle/>
           <a:p>
-            <a:pPr marL="0" lvl="0" indent="0" algn="l" rtl="0">
+            <a:pPr marL="0" lvl="0" indent="0" algn="ctr" rtl="0">
               <a:spcBef>
                 <a:spcPts val="0"/>
               </a:spcBef>
@@ -7151,11 +7571,7 @@
             </a:pPr>
             <a:r>
               <a:rPr lang="it" i="1" dirty="0"/>
-              <a:t>Description of results comparison between Core/Step</a:t>
-            </a:r>
-            <a:r>
-              <a:rPr lang="it" i="1"/>
-              <a:t>/Pipe (all)</a:t>
+              <a:t>Description of results comparison between Core/Step/Pipe (all)</a:t>
             </a:r>
             <a:endParaRPr i="1" dirty="0"/>
           </a:p>
@@ -7204,7 +7620,7 @@
 </p:sld>
 </file>
 
-<file path=ppt/slides/slide13.xml><?xml version="1.0" encoding="utf-8"?>
+<file path=ppt/slides/slide14.xml><?xml version="1.0" encoding="utf-8"?>
 <p:sld xmlns:a="http://schemas.openxmlformats.org/drawingml/2006/main" xmlns:r="http://schemas.openxmlformats.org/officeDocument/2006/relationships" xmlns:p="http://schemas.openxmlformats.org/presentationml/2006/main">
   <p:cSld>
     <p:spTree>
@@ -7648,283 +8064,6 @@
         </p:txBody>
       </p:sp>
     </p:spTree>
-  </p:cSld>
-  <p:clrMapOvr>
-    <a:masterClrMapping/>
-  </p:clrMapOvr>
-</p:sld>
-</file>
-
-<file path=ppt/slides/slide14.xml><?xml version="1.0" encoding="utf-8"?>
-<p:sld xmlns:a="http://schemas.openxmlformats.org/drawingml/2006/main" xmlns:r="http://schemas.openxmlformats.org/officeDocument/2006/relationships" xmlns:p="http://schemas.openxmlformats.org/presentationml/2006/main">
-  <p:cSld>
-    <p:spTree>
-      <p:nvGrpSpPr>
-        <p:cNvPr id="1" name=""/>
-        <p:cNvGrpSpPr/>
-        <p:nvPr/>
-      </p:nvGrpSpPr>
-      <p:grpSpPr>
-        <a:xfrm>
-          <a:off x="0" y="0"/>
-          <a:ext cx="0" cy="0"/>
-          <a:chOff x="0" y="0"/>
-          <a:chExt cx="0" cy="0"/>
-        </a:xfrm>
-      </p:grpSpPr>
-      <p:sp>
-        <p:nvSpPr>
-          <p:cNvPr id="2" name="Titolo 1">
-            <a:extLst>
-              <a:ext uri="{FF2B5EF4-FFF2-40B4-BE49-F238E27FC236}">
-                <a16:creationId xmlns:a16="http://schemas.microsoft.com/office/drawing/2014/main" id="{B080E09A-B74D-69E7-20C2-11E8FAB78A98}"/>
-              </a:ext>
-            </a:extLst>
-          </p:cNvPr>
-          <p:cNvSpPr>
-            <a:spLocks noGrp="1"/>
-          </p:cNvSpPr>
-          <p:nvPr>
-            <p:ph type="title"/>
-          </p:nvPr>
-        </p:nvSpPr>
-        <p:spPr>
-          <a:xfrm>
-            <a:off x="265500" y="1233175"/>
-            <a:ext cx="4045200" cy="1482300"/>
-          </a:xfrm>
-        </p:spPr>
-        <p:txBody>
-          <a:bodyPr wrap="square" anchor="b">
-            <a:normAutofit/>
-          </a:bodyPr>
-          <a:lstStyle/>
-          <a:p>
-            <a:r>
-              <a:rPr lang="it-IT" i="1" dirty="0" err="1"/>
-              <a:t>Conclusion</a:t>
-            </a:r>
-            <a:endParaRPr lang="it-IT" i="1" dirty="0"/>
-          </a:p>
-        </p:txBody>
-      </p:sp>
-      <p:sp>
-        <p:nvSpPr>
-          <p:cNvPr id="8" name="Subtitle 2">
-            <a:extLst>
-              <a:ext uri="{FF2B5EF4-FFF2-40B4-BE49-F238E27FC236}">
-                <a16:creationId xmlns:a16="http://schemas.microsoft.com/office/drawing/2014/main" id="{A869AE10-B673-4FBC-2E64-C2E0EF1B89F8}"/>
-              </a:ext>
-            </a:extLst>
-          </p:cNvPr>
-          <p:cNvSpPr>
-            <a:spLocks noGrp="1"/>
-          </p:cNvSpPr>
-          <p:nvPr>
-            <p:ph type="subTitle" idx="1"/>
-          </p:nvPr>
-        </p:nvSpPr>
-        <p:spPr>
-          <a:xfrm>
-            <a:off x="265500" y="2803075"/>
-            <a:ext cx="4045200" cy="1235100"/>
-          </a:xfrm>
-        </p:spPr>
-        <p:txBody>
-          <a:bodyPr/>
-          <a:lstStyle/>
-          <a:p>
-            <a:r>
-              <a:rPr lang="en-US" i="1" dirty="0"/>
-              <a:t>Which libraries is the best? Why not other?</a:t>
-            </a:r>
-          </a:p>
-          <a:p>
-            <a:endParaRPr lang="en-US" dirty="0"/>
-          </a:p>
-        </p:txBody>
-      </p:sp>
-      <p:sp>
-        <p:nvSpPr>
-          <p:cNvPr id="3" name="Segnaposto testo 2">
-            <a:extLst>
-              <a:ext uri="{FF2B5EF4-FFF2-40B4-BE49-F238E27FC236}">
-                <a16:creationId xmlns:a16="http://schemas.microsoft.com/office/drawing/2014/main" id="{697BE09F-8CDA-03FD-230B-33E6DF978FCD}"/>
-              </a:ext>
-            </a:extLst>
-          </p:cNvPr>
-          <p:cNvSpPr>
-            <a:spLocks noGrp="1"/>
-          </p:cNvSpPr>
-          <p:nvPr>
-            <p:ph type="body" idx="2"/>
-          </p:nvPr>
-        </p:nvSpPr>
-        <p:spPr>
-          <a:xfrm>
-            <a:off x="4954014" y="955525"/>
-            <a:ext cx="3837000" cy="3695100"/>
-          </a:xfrm>
-        </p:spPr>
-        <p:txBody>
-          <a:bodyPr wrap="square" anchor="ctr">
-            <a:normAutofit/>
-          </a:bodyPr>
-          <a:lstStyle/>
-          <a:p>
-            <a:pPr marL="114300" indent="0" algn="l">
-              <a:buNone/>
-            </a:pPr>
-            <a:r>
-              <a:rPr lang="en-US" sz="1600" b="1" i="0" dirty="0" err="1">
-                <a:solidFill>
-                  <a:schemeClr val="tx1"/>
-                </a:solidFill>
-                <a:effectLst/>
-                <a:latin typeface="+mn-lt"/>
-              </a:rPr>
-              <a:t>Vaex</a:t>
-            </a:r>
-            <a:r>
-              <a:rPr lang="en-US" sz="1600" b="1" i="0" dirty="0">
-                <a:solidFill>
-                  <a:schemeClr val="tx1"/>
-                </a:solidFill>
-                <a:effectLst/>
-                <a:latin typeface="+mn-lt"/>
-              </a:rPr>
-              <a:t>:</a:t>
-            </a:r>
-          </a:p>
-          <a:p>
-            <a:pPr marL="114300" indent="0" algn="l">
-              <a:buNone/>
-            </a:pPr>
-            <a:endParaRPr lang="en-US" sz="1600" b="0" i="0" dirty="0">
-              <a:solidFill>
-                <a:schemeClr val="tx1"/>
-              </a:solidFill>
-              <a:effectLst/>
-              <a:latin typeface="+mn-lt"/>
-            </a:endParaRPr>
-          </a:p>
-          <a:p>
-            <a:pPr marL="114300" indent="0" algn="l">
-              <a:buNone/>
-            </a:pPr>
-            <a:r>
-              <a:rPr lang="en-US" sz="1600" b="0" i="1" dirty="0">
-                <a:solidFill>
-                  <a:schemeClr val="tx1"/>
-                </a:solidFill>
-                <a:effectLst/>
-                <a:latin typeface="+mn-lt"/>
-              </a:rPr>
-              <a:t>Strengths</a:t>
-            </a:r>
-            <a:r>
-              <a:rPr lang="en-US" sz="1600" b="0" dirty="0">
-                <a:solidFill>
-                  <a:schemeClr val="tx1"/>
-                </a:solidFill>
-                <a:effectLst/>
-                <a:latin typeface="+mn-lt"/>
-              </a:rPr>
-              <a:t>: Efficient for out-of-core computation and large datasets; support for lazy evaluation; fast and memory efficient.</a:t>
-            </a:r>
-          </a:p>
-          <a:p>
-            <a:pPr algn="l">
-              <a:buFont typeface="Arial" panose="020B0604020202020204" pitchFamily="34" charset="0"/>
-              <a:buChar char="•"/>
-            </a:pPr>
-            <a:endParaRPr lang="en-US" sz="1600" b="0" dirty="0">
-              <a:solidFill>
-                <a:schemeClr val="tx1"/>
-              </a:solidFill>
-              <a:effectLst/>
-              <a:latin typeface="+mn-lt"/>
-            </a:endParaRPr>
-          </a:p>
-          <a:p>
-            <a:pPr marL="114300" indent="0" algn="l">
-              <a:buNone/>
-            </a:pPr>
-            <a:r>
-              <a:rPr lang="en-US" sz="1600" b="0" i="1" dirty="0">
-                <a:solidFill>
-                  <a:schemeClr val="tx1"/>
-                </a:solidFill>
-                <a:effectLst/>
-                <a:latin typeface="+mn-lt"/>
-              </a:rPr>
-              <a:t>Limitations</a:t>
-            </a:r>
-            <a:r>
-              <a:rPr lang="en-US" sz="1600" b="0" dirty="0">
-                <a:solidFill>
-                  <a:schemeClr val="tx1"/>
-                </a:solidFill>
-                <a:effectLst/>
-                <a:latin typeface="+mn-lt"/>
-              </a:rPr>
-              <a:t>: Limited support for complex operations; may not cover all Pandas functionality; </a:t>
-            </a:r>
-            <a:r>
-              <a:rPr lang="it-IT" sz="1600" b="0" i="0" dirty="0">
-                <a:solidFill>
-                  <a:schemeClr val="tx1"/>
-                </a:solidFill>
-                <a:effectLst/>
-                <a:latin typeface="Roboto" panose="020F0502020204030204" pitchFamily="2" charset="0"/>
-              </a:rPr>
-              <a:t>single machine </a:t>
-            </a:r>
-            <a:r>
-              <a:rPr lang="it-IT" sz="1600" b="0" i="0" dirty="0" err="1">
-                <a:solidFill>
-                  <a:schemeClr val="tx1"/>
-                </a:solidFill>
-                <a:effectLst/>
-                <a:latin typeface="Roboto" panose="020F0502020204030204" pitchFamily="2" charset="0"/>
-              </a:rPr>
-              <a:t>solution</a:t>
-            </a:r>
-            <a:r>
-              <a:rPr lang="it-IT" sz="1600" b="0" i="0" dirty="0">
-                <a:solidFill>
-                  <a:schemeClr val="tx1"/>
-                </a:solidFill>
-                <a:effectLst/>
-                <a:latin typeface="Roboto" panose="020F0502020204030204" pitchFamily="2" charset="0"/>
-              </a:rPr>
-              <a:t>.</a:t>
-            </a:r>
-            <a:endParaRPr lang="en-US" sz="1600" b="0" dirty="0">
-              <a:solidFill>
-                <a:schemeClr val="tx1"/>
-              </a:solidFill>
-              <a:effectLst/>
-              <a:latin typeface="+mn-lt"/>
-            </a:endParaRPr>
-          </a:p>
-          <a:p>
-            <a:pPr marL="114300" indent="0">
-              <a:spcAft>
-                <a:spcPts val="600"/>
-              </a:spcAft>
-              <a:buNone/>
-            </a:pPr>
-            <a:endParaRPr lang="it-IT" dirty="0"/>
-          </a:p>
-        </p:txBody>
-      </p:sp>
-    </p:spTree>
-    <p:extLst>
-      <p:ext uri="{BB962C8B-B14F-4D97-AF65-F5344CB8AC3E}">
-        <p14:creationId xmlns:p14="http://schemas.microsoft.com/office/powerpoint/2010/main" val="500427691"/>
-      </p:ext>
-    </p:extLst>
   </p:cSld>
   <p:clrMapOvr>
     <a:masterClrMapping/>
@@ -8039,6 +8178,283 @@
         </p:nvSpPr>
         <p:spPr>
           <a:xfrm>
+            <a:off x="4954014" y="955525"/>
+            <a:ext cx="3837000" cy="3695100"/>
+          </a:xfrm>
+        </p:spPr>
+        <p:txBody>
+          <a:bodyPr wrap="square" anchor="ctr">
+            <a:normAutofit/>
+          </a:bodyPr>
+          <a:lstStyle/>
+          <a:p>
+            <a:pPr marL="114300" indent="0" algn="l">
+              <a:buNone/>
+            </a:pPr>
+            <a:r>
+              <a:rPr lang="en-US" sz="1600" b="1" i="0" dirty="0" err="1">
+                <a:solidFill>
+                  <a:schemeClr val="tx1"/>
+                </a:solidFill>
+                <a:effectLst/>
+                <a:latin typeface="+mn-lt"/>
+              </a:rPr>
+              <a:t>Vaex</a:t>
+            </a:r>
+            <a:r>
+              <a:rPr lang="en-US" sz="1600" b="1" i="0" dirty="0">
+                <a:solidFill>
+                  <a:schemeClr val="tx1"/>
+                </a:solidFill>
+                <a:effectLst/>
+                <a:latin typeface="+mn-lt"/>
+              </a:rPr>
+              <a:t>:</a:t>
+            </a:r>
+          </a:p>
+          <a:p>
+            <a:pPr marL="114300" indent="0" algn="l">
+              <a:buNone/>
+            </a:pPr>
+            <a:endParaRPr lang="en-US" sz="1600" b="0" i="0" dirty="0">
+              <a:solidFill>
+                <a:schemeClr val="tx1"/>
+              </a:solidFill>
+              <a:effectLst/>
+              <a:latin typeface="+mn-lt"/>
+            </a:endParaRPr>
+          </a:p>
+          <a:p>
+            <a:pPr marL="114300" indent="0" algn="l">
+              <a:buNone/>
+            </a:pPr>
+            <a:r>
+              <a:rPr lang="en-US" sz="1600" b="0" i="1" dirty="0">
+                <a:solidFill>
+                  <a:schemeClr val="tx1"/>
+                </a:solidFill>
+                <a:effectLst/>
+                <a:latin typeface="+mn-lt"/>
+              </a:rPr>
+              <a:t>Strengths</a:t>
+            </a:r>
+            <a:r>
+              <a:rPr lang="en-US" sz="1600" b="0" dirty="0">
+                <a:solidFill>
+                  <a:schemeClr val="tx1"/>
+                </a:solidFill>
+                <a:effectLst/>
+                <a:latin typeface="+mn-lt"/>
+              </a:rPr>
+              <a:t>: Efficient for out-of-core computation and large datasets; support for lazy evaluation; fast and memory efficient.</a:t>
+            </a:r>
+          </a:p>
+          <a:p>
+            <a:pPr algn="l">
+              <a:buFont typeface="Arial" panose="020B0604020202020204" pitchFamily="34" charset="0"/>
+              <a:buChar char="•"/>
+            </a:pPr>
+            <a:endParaRPr lang="en-US" sz="1600" b="0" dirty="0">
+              <a:solidFill>
+                <a:schemeClr val="tx1"/>
+              </a:solidFill>
+              <a:effectLst/>
+              <a:latin typeface="+mn-lt"/>
+            </a:endParaRPr>
+          </a:p>
+          <a:p>
+            <a:pPr marL="114300" indent="0" algn="l">
+              <a:buNone/>
+            </a:pPr>
+            <a:r>
+              <a:rPr lang="en-US" sz="1600" b="0" i="1" dirty="0">
+                <a:solidFill>
+                  <a:schemeClr val="tx1"/>
+                </a:solidFill>
+                <a:effectLst/>
+                <a:latin typeface="+mn-lt"/>
+              </a:rPr>
+              <a:t>Limitations</a:t>
+            </a:r>
+            <a:r>
+              <a:rPr lang="en-US" sz="1600" b="0" dirty="0">
+                <a:solidFill>
+                  <a:schemeClr val="tx1"/>
+                </a:solidFill>
+                <a:effectLst/>
+                <a:latin typeface="+mn-lt"/>
+              </a:rPr>
+              <a:t>: Limited support for complex operations; may not cover all Pandas functionality; </a:t>
+            </a:r>
+            <a:r>
+              <a:rPr lang="it-IT" sz="1600" b="0" i="0" dirty="0">
+                <a:solidFill>
+                  <a:schemeClr val="tx1"/>
+                </a:solidFill>
+                <a:effectLst/>
+                <a:latin typeface="Roboto" panose="020F0502020204030204" pitchFamily="2" charset="0"/>
+              </a:rPr>
+              <a:t>single machine </a:t>
+            </a:r>
+            <a:r>
+              <a:rPr lang="it-IT" sz="1600" b="0" i="0" dirty="0" err="1">
+                <a:solidFill>
+                  <a:schemeClr val="tx1"/>
+                </a:solidFill>
+                <a:effectLst/>
+                <a:latin typeface="Roboto" panose="020F0502020204030204" pitchFamily="2" charset="0"/>
+              </a:rPr>
+              <a:t>solution</a:t>
+            </a:r>
+            <a:r>
+              <a:rPr lang="it-IT" sz="1600" b="0" i="0" dirty="0">
+                <a:solidFill>
+                  <a:schemeClr val="tx1"/>
+                </a:solidFill>
+                <a:effectLst/>
+                <a:latin typeface="Roboto" panose="020F0502020204030204" pitchFamily="2" charset="0"/>
+              </a:rPr>
+              <a:t>.</a:t>
+            </a:r>
+            <a:endParaRPr lang="en-US" sz="1600" b="0" dirty="0">
+              <a:solidFill>
+                <a:schemeClr val="tx1"/>
+              </a:solidFill>
+              <a:effectLst/>
+              <a:latin typeface="+mn-lt"/>
+            </a:endParaRPr>
+          </a:p>
+          <a:p>
+            <a:pPr marL="114300" indent="0">
+              <a:spcAft>
+                <a:spcPts val="600"/>
+              </a:spcAft>
+              <a:buNone/>
+            </a:pPr>
+            <a:endParaRPr lang="it-IT" dirty="0"/>
+          </a:p>
+        </p:txBody>
+      </p:sp>
+    </p:spTree>
+    <p:extLst>
+      <p:ext uri="{BB962C8B-B14F-4D97-AF65-F5344CB8AC3E}">
+        <p14:creationId xmlns:p14="http://schemas.microsoft.com/office/powerpoint/2010/main" val="500427691"/>
+      </p:ext>
+    </p:extLst>
+  </p:cSld>
+  <p:clrMapOvr>
+    <a:masterClrMapping/>
+  </p:clrMapOvr>
+</p:sld>
+</file>
+
+<file path=ppt/slides/slide16.xml><?xml version="1.0" encoding="utf-8"?>
+<p:sld xmlns:a="http://schemas.openxmlformats.org/drawingml/2006/main" xmlns:r="http://schemas.openxmlformats.org/officeDocument/2006/relationships" xmlns:p="http://schemas.openxmlformats.org/presentationml/2006/main">
+  <p:cSld>
+    <p:spTree>
+      <p:nvGrpSpPr>
+        <p:cNvPr id="1" name=""/>
+        <p:cNvGrpSpPr/>
+        <p:nvPr/>
+      </p:nvGrpSpPr>
+      <p:grpSpPr>
+        <a:xfrm>
+          <a:off x="0" y="0"/>
+          <a:ext cx="0" cy="0"/>
+          <a:chOff x="0" y="0"/>
+          <a:chExt cx="0" cy="0"/>
+        </a:xfrm>
+      </p:grpSpPr>
+      <p:sp>
+        <p:nvSpPr>
+          <p:cNvPr id="2" name="Titolo 1">
+            <a:extLst>
+              <a:ext uri="{FF2B5EF4-FFF2-40B4-BE49-F238E27FC236}">
+                <a16:creationId xmlns:a16="http://schemas.microsoft.com/office/drawing/2014/main" id="{B080E09A-B74D-69E7-20C2-11E8FAB78A98}"/>
+              </a:ext>
+            </a:extLst>
+          </p:cNvPr>
+          <p:cNvSpPr>
+            <a:spLocks noGrp="1"/>
+          </p:cNvSpPr>
+          <p:nvPr>
+            <p:ph type="title"/>
+          </p:nvPr>
+        </p:nvSpPr>
+        <p:spPr>
+          <a:xfrm>
+            <a:off x="265500" y="1233175"/>
+            <a:ext cx="4045200" cy="1482300"/>
+          </a:xfrm>
+        </p:spPr>
+        <p:txBody>
+          <a:bodyPr wrap="square" anchor="b">
+            <a:normAutofit/>
+          </a:bodyPr>
+          <a:lstStyle/>
+          <a:p>
+            <a:r>
+              <a:rPr lang="it-IT" i="1" dirty="0" err="1"/>
+              <a:t>Conclusion</a:t>
+            </a:r>
+            <a:endParaRPr lang="it-IT" i="1" dirty="0"/>
+          </a:p>
+        </p:txBody>
+      </p:sp>
+      <p:sp>
+        <p:nvSpPr>
+          <p:cNvPr id="8" name="Subtitle 2">
+            <a:extLst>
+              <a:ext uri="{FF2B5EF4-FFF2-40B4-BE49-F238E27FC236}">
+                <a16:creationId xmlns:a16="http://schemas.microsoft.com/office/drawing/2014/main" id="{A869AE10-B673-4FBC-2E64-C2E0EF1B89F8}"/>
+              </a:ext>
+            </a:extLst>
+          </p:cNvPr>
+          <p:cNvSpPr>
+            <a:spLocks noGrp="1"/>
+          </p:cNvSpPr>
+          <p:nvPr>
+            <p:ph type="subTitle" idx="1"/>
+          </p:nvPr>
+        </p:nvSpPr>
+        <p:spPr>
+          <a:xfrm>
+            <a:off x="265500" y="2803075"/>
+            <a:ext cx="4045200" cy="1235100"/>
+          </a:xfrm>
+        </p:spPr>
+        <p:txBody>
+          <a:bodyPr/>
+          <a:lstStyle/>
+          <a:p>
+            <a:r>
+              <a:rPr lang="en-US" i="1" dirty="0"/>
+              <a:t>Which libraries is the best? Why not other?</a:t>
+            </a:r>
+          </a:p>
+          <a:p>
+            <a:endParaRPr lang="en-US" dirty="0"/>
+          </a:p>
+        </p:txBody>
+      </p:sp>
+      <p:sp>
+        <p:nvSpPr>
+          <p:cNvPr id="3" name="Segnaposto testo 2">
+            <a:extLst>
+              <a:ext uri="{FF2B5EF4-FFF2-40B4-BE49-F238E27FC236}">
+                <a16:creationId xmlns:a16="http://schemas.microsoft.com/office/drawing/2014/main" id="{697BE09F-8CDA-03FD-230B-33E6DF978FCD}"/>
+              </a:ext>
+            </a:extLst>
+          </p:cNvPr>
+          <p:cNvSpPr>
+            <a:spLocks noGrp="1"/>
+          </p:cNvSpPr>
+          <p:nvPr>
+            <p:ph type="body" idx="2"/>
+          </p:nvPr>
+        </p:nvSpPr>
+        <p:spPr>
+          <a:xfrm>
             <a:off x="4954014" y="867925"/>
             <a:ext cx="3837000" cy="3695100"/>
           </a:xfrm>
@@ -8245,7 +8661,7 @@
 </p:sld>
 </file>
 
-<file path=ppt/slides/slide16.xml><?xml version="1.0" encoding="utf-8"?>
+<file path=ppt/slides/slide17.xml><?xml version="1.0" encoding="utf-8"?>
 <p:sld xmlns:a="http://schemas.openxmlformats.org/drawingml/2006/main" xmlns:r="http://schemas.openxmlformats.org/officeDocument/2006/relationships" xmlns:p="http://schemas.openxmlformats.org/presentationml/2006/main">
   <p:cSld>
     <p:bg>
@@ -8421,7 +8837,7 @@
         </p:nvSpPr>
         <p:spPr>
           <a:xfrm>
-            <a:off x="986614" y="288275"/>
+            <a:off x="311700" y="288275"/>
             <a:ext cx="8520600" cy="572700"/>
           </a:xfrm>
           <a:prstGeom prst="rect">
@@ -8434,7 +8850,7 @@
           </a:bodyPr>
           <a:lstStyle/>
           <a:p>
-            <a:pPr marL="0" lvl="0" indent="0" algn="l" rtl="0">
+            <a:pPr marL="0" lvl="0" indent="0" algn="ctr" rtl="0">
               <a:spcBef>
                 <a:spcPts val="0"/>
               </a:spcBef>
@@ -9004,7 +9420,7 @@
         </p:nvSpPr>
         <p:spPr>
           <a:xfrm>
-            <a:off x="1284157" y="169254"/>
+            <a:off x="311700" y="126316"/>
             <a:ext cx="8520600" cy="572700"/>
           </a:xfrm>
           <a:prstGeom prst="rect">
@@ -9017,7 +9433,7 @@
           </a:bodyPr>
           <a:lstStyle/>
           <a:p>
-            <a:pPr marL="0" lvl="0" indent="0" algn="l" rtl="0">
+            <a:pPr marL="0" lvl="0" indent="0" algn="ctr" rtl="0">
               <a:spcBef>
                 <a:spcPts val="0"/>
               </a:spcBef>
@@ -9853,7 +10269,7 @@
         </p:nvSpPr>
         <p:spPr>
           <a:xfrm>
-            <a:off x="2834127" y="208447"/>
+            <a:off x="2555866" y="223315"/>
             <a:ext cx="4032268" cy="572700"/>
           </a:xfrm>
           <a:prstGeom prst="rect">
@@ -9866,7 +10282,7 @@
           </a:bodyPr>
           <a:lstStyle/>
           <a:p>
-            <a:pPr marL="0" lvl="0" indent="0" algn="l" rtl="0">
+            <a:pPr marL="0" lvl="0" indent="0" algn="ctr" rtl="0">
               <a:spcBef>
                 <a:spcPts val="0"/>
               </a:spcBef>
@@ -9913,66 +10329,57 @@
                 <a:spcPts val="0"/>
               </a:spcBef>
               <a:spcAft>
-                <a:spcPts val="0"/>
+                <a:spcPts val="600"/>
               </a:spcAft>
               <a:buNone/>
             </a:pPr>
             <a:r>
-              <a:rPr lang="it" sz="1600" dirty="0"/>
+              <a:rPr lang="it" sz="2400" dirty="0"/>
               <a:t>EDA</a:t>
             </a:r>
-            <a:endParaRPr sz="1600" dirty="0"/>
+            <a:endParaRPr sz="2400" dirty="0"/>
           </a:p>
           <a:p>
             <a:pPr marL="285750" indent="-285750" algn="just">
               <a:lnSpc>
                 <a:spcPct val="100000"/>
               </a:lnSpc>
-              <a:spcBef>
-                <a:spcPts val="1200"/>
-              </a:spcBef>
-              <a:spcAft>
-                <a:spcPts val="1200"/>
+              <a:spcAft>
+                <a:spcPts val="600"/>
               </a:spcAft>
             </a:pPr>
             <a:r>
-              <a:rPr lang="it-IT" sz="1200" dirty="0" err="1"/>
+              <a:rPr lang="it-IT" dirty="0" err="1"/>
               <a:t>get_stats</a:t>
             </a:r>
-            <a:endParaRPr lang="it-IT" sz="1200" dirty="0"/>
+            <a:endParaRPr lang="it-IT" dirty="0"/>
           </a:p>
           <a:p>
             <a:pPr marL="285750" indent="-285750">
               <a:lnSpc>
                 <a:spcPct val="100000"/>
               </a:lnSpc>
-              <a:spcBef>
-                <a:spcPts val="1200"/>
-              </a:spcBef>
-              <a:spcAft>
-                <a:spcPts val="1200"/>
+              <a:spcAft>
+                <a:spcPts val="600"/>
               </a:spcAft>
             </a:pPr>
             <a:r>
-              <a:rPr lang="it-IT" sz="1200" dirty="0" err="1"/>
+              <a:rPr lang="it-IT" dirty="0" err="1"/>
               <a:t>get_columns</a:t>
             </a:r>
-            <a:endParaRPr lang="it-IT" sz="1200" u="sng" dirty="0"/>
+            <a:endParaRPr lang="it-IT" u="sng" dirty="0"/>
           </a:p>
           <a:p>
             <a:pPr marL="285750" indent="-285750">
               <a:lnSpc>
                 <a:spcPct val="100000"/>
               </a:lnSpc>
-              <a:spcBef>
-                <a:spcPts val="1200"/>
-              </a:spcBef>
-              <a:spcAft>
-                <a:spcPts val="1200"/>
+              <a:spcAft>
+                <a:spcPts val="600"/>
               </a:spcAft>
             </a:pPr>
             <a:r>
-              <a:rPr lang="it-IT" sz="1200" dirty="0"/>
+              <a:rPr lang="it-IT" dirty="0"/>
               <a:t>query</a:t>
             </a:r>
           </a:p>
@@ -9981,69 +10388,57 @@
               <a:lnSpc>
                 <a:spcPct val="100000"/>
               </a:lnSpc>
-              <a:spcBef>
-                <a:spcPts val="1200"/>
-              </a:spcBef>
-              <a:spcAft>
-                <a:spcPts val="1200"/>
+              <a:spcAft>
+                <a:spcPts val="600"/>
               </a:spcAft>
             </a:pPr>
             <a:r>
-              <a:rPr lang="it-IT" sz="1200" dirty="0" err="1"/>
+              <a:rPr lang="it-IT" dirty="0" err="1"/>
               <a:t>Is_unique</a:t>
             </a:r>
-            <a:endParaRPr lang="it-IT" sz="1200" dirty="0"/>
+            <a:endParaRPr lang="it-IT" dirty="0"/>
           </a:p>
           <a:p>
             <a:pPr marL="285750" indent="-285750">
               <a:lnSpc>
                 <a:spcPct val="100000"/>
               </a:lnSpc>
-              <a:spcBef>
-                <a:spcPts val="1200"/>
-              </a:spcBef>
-              <a:spcAft>
-                <a:spcPts val="1200"/>
+              <a:spcAft>
+                <a:spcPts val="600"/>
               </a:spcAft>
             </a:pPr>
             <a:r>
-              <a:rPr lang="it-IT" sz="1200" dirty="0" err="1"/>
+              <a:rPr lang="it-IT" dirty="0" err="1"/>
               <a:t>Locate_null_values</a:t>
             </a:r>
-            <a:endParaRPr lang="it-IT" sz="1200" dirty="0"/>
+            <a:endParaRPr lang="it-IT" dirty="0"/>
           </a:p>
           <a:p>
             <a:pPr marL="285750" indent="-285750">
               <a:lnSpc>
                 <a:spcPct val="100000"/>
               </a:lnSpc>
-              <a:spcBef>
-                <a:spcPts val="1200"/>
-              </a:spcBef>
-              <a:spcAft>
-                <a:spcPts val="1200"/>
+              <a:spcAft>
+                <a:spcPts val="600"/>
               </a:spcAft>
             </a:pPr>
             <a:r>
-              <a:rPr lang="it-IT" sz="1200" dirty="0" err="1"/>
+              <a:rPr lang="it-IT" dirty="0" err="1"/>
               <a:t>Sample_rows</a:t>
             </a:r>
-            <a:endParaRPr lang="it-IT" sz="1200" dirty="0"/>
+            <a:endParaRPr lang="it-IT" dirty="0"/>
           </a:p>
           <a:p>
             <a:pPr marL="285750" indent="-285750">
               <a:lnSpc>
                 <a:spcPct val="100000"/>
               </a:lnSpc>
-              <a:spcBef>
-                <a:spcPts val="1200"/>
-              </a:spcBef>
-              <a:spcAft>
-                <a:spcPts val="1200"/>
+              <a:spcAft>
+                <a:spcPts val="600"/>
               </a:spcAft>
             </a:pPr>
             <a:r>
-              <a:rPr lang="it-IT" sz="1200" dirty="0"/>
+              <a:rPr lang="it-IT" dirty="0"/>
               <a:t>sort</a:t>
             </a:r>
           </a:p>
@@ -10072,8 +10467,8 @@
         </p:nvSpPr>
         <p:spPr>
           <a:xfrm>
-            <a:off x="3355050" y="1014590"/>
-            <a:ext cx="2433900" cy="3416400"/>
+            <a:off x="2907952" y="1014590"/>
+            <a:ext cx="3239571" cy="3416400"/>
           </a:xfrm>
           <a:prstGeom prst="rect">
             <a:avLst/>
@@ -10090,84 +10485,84 @@
                 <a:spcPts val="0"/>
               </a:spcBef>
               <a:spcAft>
-                <a:spcPts val="1200"/>
+                <a:spcPts val="600"/>
               </a:spcAft>
               <a:buNone/>
             </a:pPr>
             <a:r>
-              <a:rPr lang="it" sz="1600" dirty="0"/>
+              <a:rPr lang="it" sz="2400" dirty="0"/>
               <a:t>Data Transformation</a:t>
             </a:r>
           </a:p>
           <a:p>
             <a:pPr marL="285750" indent="-285750">
               <a:lnSpc>
-                <a:spcPct val="200000"/>
+                <a:spcPct val="100000"/>
               </a:lnSpc>
               <a:spcAft>
-                <a:spcPts val="1200"/>
+                <a:spcPts val="600"/>
               </a:spcAft>
             </a:pPr>
             <a:r>
-              <a:rPr lang="it-IT" sz="1200" dirty="0"/>
+              <a:rPr lang="it-IT" dirty="0"/>
               <a:t>C</a:t>
             </a:r>
             <a:r>
-              <a:rPr lang="it" sz="1200" dirty="0"/>
+              <a:rPr lang="it" dirty="0"/>
               <a:t>hange_date_time_format</a:t>
             </a:r>
           </a:p>
           <a:p>
             <a:pPr marL="285750" indent="-285750">
               <a:lnSpc>
-                <a:spcPct val="200000"/>
+                <a:spcPct val="100000"/>
               </a:lnSpc>
               <a:spcAft>
-                <a:spcPts val="1200"/>
+                <a:spcPts val="600"/>
               </a:spcAft>
             </a:pPr>
             <a:r>
-              <a:rPr lang="it-IT" sz="1200" dirty="0"/>
+              <a:rPr lang="it-IT" dirty="0"/>
               <a:t>D</a:t>
             </a:r>
             <a:r>
-              <a:rPr lang="it" sz="1200" dirty="0"/>
+              <a:rPr lang="it" dirty="0"/>
               <a:t>elete_columns</a:t>
             </a:r>
           </a:p>
           <a:p>
             <a:pPr marL="285750" indent="-285750">
               <a:lnSpc>
-                <a:spcPct val="200000"/>
+                <a:spcPct val="100000"/>
               </a:lnSpc>
               <a:spcAft>
-                <a:spcPts val="1200"/>
+                <a:spcPts val="600"/>
               </a:spcAft>
             </a:pPr>
             <a:r>
-              <a:rPr lang="it-IT" sz="1200" dirty="0"/>
+              <a:rPr lang="it-IT" dirty="0"/>
               <a:t>S</a:t>
             </a:r>
             <a:r>
-              <a:rPr lang="it" sz="1200" dirty="0"/>
+              <a:rPr lang="it" dirty="0"/>
               <a:t>plit</a:t>
             </a:r>
           </a:p>
           <a:p>
             <a:pPr marL="285750" indent="-285750">
               <a:lnSpc>
-                <a:spcPct val="200000"/>
+                <a:spcPct val="100000"/>
               </a:lnSpc>
               <a:spcAft>
-                <a:spcPts val="1200"/>
+                <a:spcPts val="600"/>
               </a:spcAft>
             </a:pPr>
             <a:r>
-              <a:rPr lang="it-IT" sz="1200" dirty="0"/>
+              <a:rPr lang="it-IT" dirty="0"/>
               <a:t>C</a:t>
             </a:r>
             <a:r>
-              <a:rPr lang="it" sz="1200" dirty="0"/>
+              <a:rPr lang="it" dirty="0"/>
               <a:t>alc_column</a:t>
             </a:r>
           </a:p>
@@ -10185,7 +10580,7 @@
         </p:nvSpPr>
         <p:spPr>
           <a:xfrm>
-            <a:off x="6621575" y="1014590"/>
+            <a:off x="6221348" y="1014590"/>
             <a:ext cx="2522425" cy="3416400"/>
           </a:xfrm>
           <a:prstGeom prst="rect">
@@ -10203,69 +10598,69 @@
                 <a:spcPts val="0"/>
               </a:spcBef>
               <a:spcAft>
-                <a:spcPts val="1200"/>
+                <a:spcPts val="600"/>
               </a:spcAft>
               <a:buNone/>
             </a:pPr>
             <a:r>
-              <a:rPr lang="it" sz="1600" dirty="0"/>
+              <a:rPr lang="it" sz="2400" dirty="0"/>
               <a:t>Data Cleaning</a:t>
             </a:r>
           </a:p>
           <a:p>
             <a:pPr marL="285750" indent="-285750">
               <a:lnSpc>
-                <a:spcPct val="200000"/>
+                <a:spcPct val="100000"/>
               </a:lnSpc>
               <a:spcAft>
-                <a:spcPts val="1200"/>
+                <a:spcPts val="600"/>
               </a:spcAft>
             </a:pPr>
             <a:r>
-              <a:rPr lang="it-IT" sz="1200" dirty="0"/>
+              <a:rPr lang="it-IT" dirty="0"/>
               <a:t>R</a:t>
             </a:r>
             <a:r>
-              <a:rPr lang="it" sz="1200" dirty="0"/>
+              <a:rPr lang="it" dirty="0"/>
               <a:t>eplace</a:t>
             </a:r>
           </a:p>
           <a:p>
             <a:pPr marL="285750" indent="-285750">
               <a:lnSpc>
-                <a:spcPct val="200000"/>
+                <a:spcPct val="100000"/>
               </a:lnSpc>
               <a:spcAft>
-                <a:spcPts val="1200"/>
+                <a:spcPts val="600"/>
               </a:spcAft>
             </a:pPr>
             <a:r>
-              <a:rPr lang="it-IT" sz="1200" dirty="0"/>
+              <a:rPr lang="it-IT" dirty="0"/>
               <a:t>F</a:t>
             </a:r>
             <a:r>
-              <a:rPr lang="it" sz="1200" dirty="0"/>
+              <a:rPr lang="it" dirty="0"/>
               <a:t>ill_nan</a:t>
             </a:r>
           </a:p>
           <a:p>
             <a:pPr marL="285750" indent="-285750">
               <a:lnSpc>
-                <a:spcPct val="200000"/>
+                <a:spcPct val="100000"/>
               </a:lnSpc>
               <a:spcAft>
-                <a:spcPts val="1200"/>
+                <a:spcPts val="600"/>
               </a:spcAft>
             </a:pPr>
             <a:r>
-              <a:rPr lang="it-IT" sz="1200" dirty="0"/>
+              <a:rPr lang="it-IT" dirty="0"/>
               <a:t>D</a:t>
             </a:r>
             <a:r>
-              <a:rPr lang="it" sz="1200" dirty="0"/>
+              <a:rPr lang="it" dirty="0"/>
               <a:t>elete_empty_rows</a:t>
             </a:r>
-            <a:endParaRPr sz="1200" dirty="0"/>
+            <a:endParaRPr dirty="0"/>
           </a:p>
         </p:txBody>
       </p:sp>
@@ -10306,7 +10701,7 @@
         </p:nvSpPr>
         <p:spPr>
           <a:xfrm>
-            <a:off x="1668786" y="306111"/>
+            <a:off x="1759678" y="329724"/>
             <a:ext cx="5624643" cy="572700"/>
           </a:xfrm>
           <a:prstGeom prst="rect">
@@ -10319,7 +10714,7 @@
           </a:bodyPr>
           <a:lstStyle/>
           <a:p>
-            <a:pPr marL="0" lvl="0" indent="0" algn="l" rtl="0">
+            <a:pPr marL="0" lvl="0" indent="0" algn="ctr" rtl="0">
               <a:spcBef>
                 <a:spcPts val="0"/>
               </a:spcBef>
@@ -10349,7 +10744,7 @@
         <p:spPr>
           <a:xfrm>
             <a:off x="400225" y="1420989"/>
-            <a:ext cx="2433900" cy="3416400"/>
+            <a:ext cx="2893102" cy="3416400"/>
           </a:xfrm>
           <a:prstGeom prst="rect">
             <a:avLst/>
@@ -10361,12 +10756,15 @@
           </a:bodyPr>
           <a:lstStyle/>
           <a:p>
-            <a:pPr marL="0" lvl="0" indent="0" algn="l" rtl="0">
-              <a:spcBef>
-                <a:spcPts val="0"/>
-              </a:spcBef>
-              <a:spcAft>
-                <a:spcPts val="0"/>
+            <a:pPr marL="0" lvl="0" indent="0" algn="ctr" rtl="0">
+              <a:lnSpc>
+                <a:spcPct val="100000"/>
+              </a:lnSpc>
+              <a:spcBef>
+                <a:spcPts val="0"/>
+              </a:spcBef>
+              <a:spcAft>
+                <a:spcPts val="600"/>
               </a:spcAft>
               <a:buNone/>
             </a:pPr>
@@ -10376,7 +10774,11 @@
             </a:r>
           </a:p>
           <a:p>
-            <a:pPr marL="285750" indent="-285750"/>
+            <a:pPr marL="285750" indent="-285750">
+              <a:spcAft>
+                <a:spcPts val="600"/>
+              </a:spcAft>
+            </a:pPr>
             <a:r>
               <a:rPr lang="it-IT" dirty="0"/>
               <a:t>P</a:t>
@@ -10387,7 +10789,11 @@
             </a:r>
           </a:p>
           <a:p>
-            <a:pPr marL="285750" indent="-285750"/>
+            <a:pPr marL="285750" indent="-285750">
+              <a:spcAft>
+                <a:spcPts val="600"/>
+              </a:spcAft>
+            </a:pPr>
             <a:r>
               <a:rPr lang="it-IT" dirty="0"/>
               <a:t>C</a:t>
@@ -10398,7 +10804,11 @@
             </a:r>
           </a:p>
           <a:p>
-            <a:pPr marL="285750" indent="-285750"/>
+            <a:pPr marL="285750" indent="-285750">
+              <a:spcAft>
+                <a:spcPts val="600"/>
+              </a:spcAft>
+            </a:pPr>
             <a:r>
               <a:rPr lang="it-IT" dirty="0"/>
               <a:t>L</a:t>
@@ -10409,7 +10819,11 @@
             </a:r>
           </a:p>
           <a:p>
-            <a:pPr marL="285750" indent="-285750"/>
+            <a:pPr marL="285750" indent="-285750">
+              <a:spcAft>
+                <a:spcPts val="600"/>
+              </a:spcAft>
+            </a:pPr>
             <a:r>
               <a:rPr lang="it-IT" dirty="0"/>
               <a:t>P</a:t>
@@ -10439,7 +10853,7 @@
         </p:nvSpPr>
         <p:spPr>
           <a:xfrm>
-            <a:off x="3045496" y="1420989"/>
+            <a:off x="3293327" y="1420989"/>
             <a:ext cx="3053007" cy="3416400"/>
           </a:xfrm>
           <a:prstGeom prst="rect">
@@ -10452,12 +10866,15 @@
           </a:bodyPr>
           <a:lstStyle/>
           <a:p>
-            <a:pPr marL="0" lvl="0" indent="0" algn="l" rtl="0">
-              <a:spcBef>
-                <a:spcPts val="0"/>
-              </a:spcBef>
-              <a:spcAft>
-                <a:spcPts val="1200"/>
+            <a:pPr marL="0" lvl="0" indent="0" algn="ctr" rtl="0">
+              <a:lnSpc>
+                <a:spcPct val="100000"/>
+              </a:lnSpc>
+              <a:spcBef>
+                <a:spcPts val="0"/>
+              </a:spcBef>
+              <a:spcAft>
+                <a:spcPts val="600"/>
               </a:spcAft>
               <a:buNone/>
             </a:pPr>
@@ -10467,9 +10884,12 @@
             </a:r>
           </a:p>
           <a:p>
-            <a:pPr marL="285750" indent="-285750">
-              <a:spcAft>
-                <a:spcPts val="1200"/>
+            <a:pPr marL="0" indent="-285750">
+              <a:lnSpc>
+                <a:spcPct val="100000"/>
+              </a:lnSpc>
+              <a:spcAft>
+                <a:spcPts val="600"/>
               </a:spcAft>
             </a:pPr>
             <a:r>
@@ -10482,9 +10902,12 @@
             </a:r>
           </a:p>
           <a:p>
-            <a:pPr marL="285750" indent="-285750">
-              <a:spcAft>
-                <a:spcPts val="1200"/>
+            <a:pPr marL="0" indent="-285750">
+              <a:lnSpc>
+                <a:spcPct val="100000"/>
+              </a:lnSpc>
+              <a:spcAft>
+                <a:spcPts val="600"/>
               </a:spcAft>
             </a:pPr>
             <a:r>
@@ -10510,7 +10933,7 @@
         </p:nvSpPr>
         <p:spPr>
           <a:xfrm>
-            <a:off x="6309874" y="1420989"/>
+            <a:off x="6346334" y="1420989"/>
             <a:ext cx="2433900" cy="3416400"/>
           </a:xfrm>
           <a:prstGeom prst="rect">
@@ -10523,13 +10946,13 @@
           </a:bodyPr>
           <a:lstStyle/>
           <a:p>
-            <a:pPr marL="0" lvl="0" indent="0" algn="l" rtl="0">
-              <a:spcBef>
-                <a:spcPts val="0"/>
-              </a:spcBef>
-              <a:spcAft>
-                <a:spcPts val="1200"/>
-              </a:spcAft>
+            <a:pPr marL="0" lvl="0" indent="0" algn="ctr" rtl="0">
+              <a:lnSpc>
+                <a:spcPct val="100000"/>
+              </a:lnSpc>
+              <a:spcBef>
+                <a:spcPts val="0"/>
+              </a:spcBef>
               <a:buNone/>
             </a:pPr>
             <a:r>
@@ -10577,7 +11000,7 @@
         </p:nvSpPr>
         <p:spPr>
           <a:xfrm>
-            <a:off x="1309735" y="299882"/>
+            <a:off x="1309734" y="307317"/>
             <a:ext cx="6524529" cy="572700"/>
           </a:xfrm>
           <a:prstGeom prst="rect">
@@ -10590,7 +11013,7 @@
           </a:bodyPr>
           <a:lstStyle/>
           <a:p>
-            <a:pPr marL="0" lvl="0" indent="0" algn="l" rtl="0">
+            <a:pPr marL="0" lvl="0" indent="0" algn="ctr" rtl="0">
               <a:spcBef>
                 <a:spcPts val="0"/>
               </a:spcBef>
@@ -10674,8 +11097,8 @@
         </p:nvSpPr>
         <p:spPr>
           <a:xfrm>
-            <a:off x="1016001" y="299882"/>
-            <a:ext cx="7148286" cy="572700"/>
+            <a:off x="499885" y="1880006"/>
+            <a:ext cx="2845598" cy="1383487"/>
           </a:xfrm>
           <a:prstGeom prst="rect">
             <a:avLst/>
@@ -10683,11 +11106,11 @@
         </p:spPr>
         <p:txBody>
           <a:bodyPr spcFirstLastPara="1" wrap="square" lIns="91425" tIns="91425" rIns="91425" bIns="91425" anchor="t" anchorCtr="0">
-            <a:normAutofit fontScale="90000"/>
+            <a:noAutofit/>
           </a:bodyPr>
           <a:lstStyle/>
           <a:p>
-            <a:pPr marL="0" lvl="0" indent="0" algn="l" rtl="0">
+            <a:pPr marL="0" lvl="0" indent="0" algn="ctr" rtl="0">
               <a:spcBef>
                 <a:spcPts val="0"/>
               </a:spcBef>
@@ -10718,16 +11141,15 @@
           </p:cNvPicPr>
           <p:nvPr/>
         </p:nvPicPr>
-        <p:blipFill>
+        <p:blipFill rotWithShape="1">
           <a:blip r:embed="rId3"/>
-          <a:stretch>
-            <a:fillRect/>
-          </a:stretch>
+          <a:srcRect r="50000"/>
+          <a:stretch/>
         </p:blipFill>
         <p:spPr>
           <a:xfrm>
-            <a:off x="917999" y="1060394"/>
-            <a:ext cx="7308000" cy="3633791"/>
+            <a:off x="3717074" y="121855"/>
+            <a:ext cx="4927041" cy="4899790"/>
           </a:xfrm>
           <a:prstGeom prst="rect">
             <a:avLst/>
@@ -10752,7 +11174,7 @@
   <p:cSld>
     <p:spTree>
       <p:nvGrpSpPr>
-        <p:cNvPr id="1" name="Shape 96"/>
+        <p:cNvPr id="1" name="Shape 90"/>
         <p:cNvGrpSpPr/>
         <p:nvPr/>
       </p:nvGrpSpPr>
@@ -10766,7 +11188,7 @@
       </p:grpSpPr>
       <p:sp>
         <p:nvSpPr>
-          <p:cNvPr id="97" name="Google Shape;97;p19"/>
+          <p:cNvPr id="91" name="Google Shape;91;p18"/>
           <p:cNvSpPr txBox="1">
             <a:spLocks noGrp="1"/>
           </p:cNvSpPr>
@@ -10776,8 +11198,8 @@
         </p:nvSpPr>
         <p:spPr>
           <a:xfrm>
-            <a:off x="1411335" y="343424"/>
-            <a:ext cx="6321329" cy="572700"/>
+            <a:off x="559240" y="1817580"/>
+            <a:ext cx="2882769" cy="1508338"/>
           </a:xfrm>
           <a:prstGeom prst="rect">
             <a:avLst/>
@@ -10785,11 +11207,11 @@
         </p:spPr>
         <p:txBody>
           <a:bodyPr spcFirstLastPara="1" wrap="square" lIns="91425" tIns="91425" rIns="91425" bIns="91425" anchor="t" anchorCtr="0">
-            <a:normAutofit fontScale="90000"/>
+            <a:normAutofit/>
           </a:bodyPr>
           <a:lstStyle/>
           <a:p>
-            <a:pPr marL="0" lvl="0" indent="0" algn="l" rtl="0">
+            <a:pPr marL="0" lvl="0" indent="0" algn="ctr" rtl="0">
               <a:spcBef>
                 <a:spcPts val="0"/>
               </a:spcBef>
@@ -10800,7 +11222,7 @@
             </a:pPr>
             <a:r>
               <a:rPr lang="it" i="1" dirty="0"/>
-              <a:t>Description of results on Pipeline-Step</a:t>
+              <a:t>Description of results on Core Preparators (all)</a:t>
             </a:r>
             <a:endParaRPr i="1" dirty="0"/>
           </a:p>
@@ -10808,10 +11230,10 @@
       </p:sp>
       <p:pic>
         <p:nvPicPr>
-          <p:cNvPr id="3" name="Immagine 2" descr="Immagine che contiene testo, schermata, Policromia&#10;&#10;Descrizione generata automaticamente">
+          <p:cNvPr id="4" name="Immagine 3" descr="Immagine che contiene testo, Carattere, diagramma, schermata&#10;&#10;Descrizione generata automaticamente">
             <a:extLst>
               <a:ext uri="{FF2B5EF4-FFF2-40B4-BE49-F238E27FC236}">
-                <a16:creationId xmlns:a16="http://schemas.microsoft.com/office/drawing/2014/main" id="{4CD9C2C5-DB11-4E07-5E48-B30FDC5D448C}"/>
+                <a16:creationId xmlns:a16="http://schemas.microsoft.com/office/drawing/2014/main" id="{F9675359-1512-10D2-1EB9-516AEB238BB2}"/>
               </a:ext>
             </a:extLst>
           </p:cNvPr>
@@ -10820,16 +11242,15 @@
           </p:cNvPicPr>
           <p:nvPr/>
         </p:nvPicPr>
-        <p:blipFill>
+        <p:blipFill rotWithShape="1">
           <a:blip r:embed="rId3"/>
-          <a:stretch>
-            <a:fillRect/>
-          </a:stretch>
+          <a:srcRect l="50000"/>
+          <a:stretch/>
         </p:blipFill>
         <p:spPr>
           <a:xfrm>
-            <a:off x="1063171" y="1118438"/>
-            <a:ext cx="7017656" cy="3492951"/>
+            <a:off x="3791727" y="121949"/>
+            <a:ext cx="4926847" cy="4899600"/>
           </a:xfrm>
           <a:prstGeom prst="rect">
             <a:avLst/>
@@ -10837,6 +11258,11 @@
         </p:spPr>
       </p:pic>
     </p:spTree>
+    <p:extLst>
+      <p:ext uri="{BB962C8B-B14F-4D97-AF65-F5344CB8AC3E}">
+        <p14:creationId xmlns:p14="http://schemas.microsoft.com/office/powerpoint/2010/main" val="2006565644"/>
+      </p:ext>
+    </p:extLst>
   </p:cSld>
   <p:clrMapOvr>
     <a:masterClrMapping/>
@@ -11407,6 +11833,15 @@
 </file>
 
 <file path=customXml/item1.xml><?xml version="1.0" encoding="utf-8"?>
+<?mso-contentType ?>
+<FormTemplates xmlns="http://schemas.microsoft.com/sharepoint/v3/contenttype/forms">
+  <Display>DocumentLibraryForm</Display>
+  <Edit>DocumentLibraryForm</Edit>
+  <New>DocumentLibraryForm</New>
+</FormTemplates>
+</file>
+
+<file path=customXml/item2.xml><?xml version="1.0" encoding="utf-8"?>
 <ct:contentTypeSchema xmlns:ct="http://schemas.microsoft.com/office/2006/metadata/contentType" xmlns:ma="http://schemas.microsoft.com/office/2006/metadata/properties/metaAttributes" ct:_="" ma:_="" ma:contentTypeName="Document" ma:contentTypeID="0x01010044010DD6E8A765478ECC4B4EF4800ACC" ma:contentTypeVersion="13" ma:contentTypeDescription="Create a new document." ma:contentTypeScope="" ma:versionID="a4e063bae554e24e5443f55a738cb29a">
   <xsd:schema xmlns:xsd="http://www.w3.org/2001/XMLSchema" xmlns:xs="http://www.w3.org/2001/XMLSchema" xmlns:p="http://schemas.microsoft.com/office/2006/metadata/properties" xmlns:ns2="fd22e687-371b-414e-9e15-0f1095911aa6" xmlns:ns3="b0584e29-aeb5-4056-b862-c9e01aaf115a" targetNamespace="http://schemas.microsoft.com/office/2006/metadata/properties" ma:root="true" ma:fieldsID="a34d597af065eee0ceb38710a317da13" ns2:_="" ns3:_="">
     <xsd:import namespace="fd22e687-371b-414e-9e15-0f1095911aa6"/>
@@ -11629,16 +12064,15 @@
 </ct:contentTypeSchema>
 </file>
 
-<file path=customXml/item2.xml><?xml version="1.0" encoding="utf-8"?>
-<?mso-contentType ?>
-<FormTemplates xmlns="http://schemas.microsoft.com/sharepoint/v3/contenttype/forms">
-  <Display>DocumentLibraryForm</Display>
-  <Edit>DocumentLibraryForm</Edit>
-  <New>DocumentLibraryForm</New>
-</FormTemplates>
+<file path=customXml/itemProps1.xml><?xml version="1.0" encoding="utf-8"?>
+<ds:datastoreItem xmlns:ds="http://schemas.openxmlformats.org/officeDocument/2006/customXml" ds:itemID="{34CC30C9-2DDA-45A2-8096-27594D600213}">
+  <ds:schemaRefs>
+    <ds:schemaRef ds:uri="http://schemas.microsoft.com/sharepoint/v3/contenttype/forms"/>
+  </ds:schemaRefs>
+</ds:datastoreItem>
 </file>
 
-<file path=customXml/itemProps1.xml><?xml version="1.0" encoding="utf-8"?>
+<file path=customXml/itemProps2.xml><?xml version="1.0" encoding="utf-8"?>
 <ds:datastoreItem xmlns:ds="http://schemas.openxmlformats.org/officeDocument/2006/customXml" ds:itemID="{D91B5D6A-DB59-4B37-855C-02216C6CE879}">
   <ds:schemaRefs>
     <ds:schemaRef ds:uri="http://schemas.microsoft.com/office/2006/metadata/contentType"/>
@@ -11655,12 +12089,4 @@
     <ds:schemaRef ds:uri="http://schemas.microsoft.com/internal/obd"/>
   </ds:schemaRefs>
 </ds:datastoreItem>
-</file>
-
-<file path=customXml/itemProps2.xml><?xml version="1.0" encoding="utf-8"?>
-<ds:datastoreItem xmlns:ds="http://schemas.openxmlformats.org/officeDocument/2006/customXml" ds:itemID="{34CC30C9-2DDA-45A2-8096-27594D600213}">
-  <ds:schemaRefs>
-    <ds:schemaRef ds:uri="http://schemas.microsoft.com/sharepoint/v3/contenttype/forms"/>
-  </ds:schemaRefs>
-</ds:datastoreItem>
 </file>
</xml_diff>

<commit_message>
Fix to pptx for the oral presentation
</commit_message>
<xml_diff>
--- a/Ferrari-Pavone-Pederzoli.pptx
+++ b/Ferrari-Pavone-Pederzoli.pptx
@@ -5,7 +5,7 @@
     <p:sldMasterId id="2147483659" r:id="rId3"/>
   </p:sldMasterIdLst>
   <p:notesMasterIdLst>
-    <p:notesMasterId r:id="rId21"/>
+    <p:notesMasterId r:id="rId22"/>
   </p:notesMasterIdLst>
   <p:sldIdLst>
     <p:sldId id="265" r:id="rId4"/>
@@ -24,7 +24,8 @@
     <p:sldId id="264" r:id="rId17"/>
     <p:sldId id="268" r:id="rId18"/>
     <p:sldId id="272" r:id="rId19"/>
-    <p:sldId id="267" r:id="rId20"/>
+    <p:sldId id="277" r:id="rId20"/>
+    <p:sldId id="267" r:id="rId21"/>
   </p:sldIdLst>
   <p:sldSz cx="9144000" cy="5143500" type="screen16x9"/>
   <p:notesSz cx="6858000" cy="9144000"/>
@@ -8664,6 +8665,242 @@
 <file path=ppt/slides/slide17.xml><?xml version="1.0" encoding="utf-8"?>
 <p:sld xmlns:a="http://schemas.openxmlformats.org/drawingml/2006/main" xmlns:r="http://schemas.openxmlformats.org/officeDocument/2006/relationships" xmlns:p="http://schemas.openxmlformats.org/presentationml/2006/main">
   <p:cSld>
+    <p:spTree>
+      <p:nvGrpSpPr>
+        <p:cNvPr id="1" name="">
+          <a:extLst>
+            <a:ext uri="{FF2B5EF4-FFF2-40B4-BE49-F238E27FC236}">
+              <a16:creationId xmlns:a16="http://schemas.microsoft.com/office/drawing/2014/main" id="{82920E22-1949-C0A8-5F82-EB8E6B898348}"/>
+            </a:ext>
+          </a:extLst>
+        </p:cNvPr>
+        <p:cNvGrpSpPr/>
+        <p:nvPr/>
+      </p:nvGrpSpPr>
+      <p:grpSpPr>
+        <a:xfrm>
+          <a:off x="0" y="0"/>
+          <a:ext cx="0" cy="0"/>
+          <a:chOff x="0" y="0"/>
+          <a:chExt cx="0" cy="0"/>
+        </a:xfrm>
+      </p:grpSpPr>
+      <p:sp>
+        <p:nvSpPr>
+          <p:cNvPr id="2" name="Titolo 1">
+            <a:extLst>
+              <a:ext uri="{FF2B5EF4-FFF2-40B4-BE49-F238E27FC236}">
+                <a16:creationId xmlns:a16="http://schemas.microsoft.com/office/drawing/2014/main" id="{CB53ACEC-B84A-7863-C9C8-EC25A75C43D5}"/>
+              </a:ext>
+            </a:extLst>
+          </p:cNvPr>
+          <p:cNvSpPr>
+            <a:spLocks noGrp="1"/>
+          </p:cNvSpPr>
+          <p:nvPr>
+            <p:ph type="title"/>
+          </p:nvPr>
+        </p:nvSpPr>
+        <p:spPr>
+          <a:xfrm>
+            <a:off x="265500" y="1233175"/>
+            <a:ext cx="4045200" cy="1482300"/>
+          </a:xfrm>
+        </p:spPr>
+        <p:txBody>
+          <a:bodyPr wrap="square" anchor="b">
+            <a:normAutofit/>
+          </a:bodyPr>
+          <a:lstStyle/>
+          <a:p>
+            <a:r>
+              <a:rPr lang="it-IT" i="1" dirty="0" err="1"/>
+              <a:t>Conclusion</a:t>
+            </a:r>
+            <a:endParaRPr lang="it-IT" i="1" dirty="0"/>
+          </a:p>
+        </p:txBody>
+      </p:sp>
+      <p:sp>
+        <p:nvSpPr>
+          <p:cNvPr id="8" name="Subtitle 2">
+            <a:extLst>
+              <a:ext uri="{FF2B5EF4-FFF2-40B4-BE49-F238E27FC236}">
+                <a16:creationId xmlns:a16="http://schemas.microsoft.com/office/drawing/2014/main" id="{455A5796-4ECC-BE8A-58F5-22178F0D4523}"/>
+              </a:ext>
+            </a:extLst>
+          </p:cNvPr>
+          <p:cNvSpPr>
+            <a:spLocks noGrp="1"/>
+          </p:cNvSpPr>
+          <p:nvPr>
+            <p:ph type="subTitle" idx="1"/>
+          </p:nvPr>
+        </p:nvSpPr>
+        <p:spPr>
+          <a:xfrm>
+            <a:off x="265500" y="2803075"/>
+            <a:ext cx="4045200" cy="1235100"/>
+          </a:xfrm>
+        </p:spPr>
+        <p:txBody>
+          <a:bodyPr/>
+          <a:lstStyle/>
+          <a:p>
+            <a:r>
+              <a:rPr lang="en-US" i="1" dirty="0"/>
+              <a:t>Which libraries is the best? Why not other?</a:t>
+            </a:r>
+          </a:p>
+          <a:p>
+            <a:endParaRPr lang="en-US" dirty="0"/>
+          </a:p>
+        </p:txBody>
+      </p:sp>
+      <p:sp>
+        <p:nvSpPr>
+          <p:cNvPr id="3" name="Segnaposto testo 2">
+            <a:extLst>
+              <a:ext uri="{FF2B5EF4-FFF2-40B4-BE49-F238E27FC236}">
+                <a16:creationId xmlns:a16="http://schemas.microsoft.com/office/drawing/2014/main" id="{DE792A93-5765-45AD-A8E7-B8F959067808}"/>
+              </a:ext>
+            </a:extLst>
+          </p:cNvPr>
+          <p:cNvSpPr>
+            <a:spLocks noGrp="1"/>
+          </p:cNvSpPr>
+          <p:nvPr>
+            <p:ph type="body" idx="2"/>
+          </p:nvPr>
+        </p:nvSpPr>
+        <p:spPr>
+          <a:xfrm>
+            <a:off x="4946579" y="724200"/>
+            <a:ext cx="3837000" cy="3695100"/>
+          </a:xfrm>
+        </p:spPr>
+        <p:txBody>
+          <a:bodyPr wrap="square" anchor="ctr">
+            <a:normAutofit/>
+          </a:bodyPr>
+          <a:lstStyle/>
+          <a:p>
+            <a:pPr marL="114300" indent="0" algn="l">
+              <a:buNone/>
+            </a:pPr>
+            <a:r>
+              <a:rPr lang="en-US" sz="1600" b="1" i="0" dirty="0">
+                <a:solidFill>
+                  <a:schemeClr val="tx1"/>
+                </a:solidFill>
+                <a:effectLst/>
+                <a:latin typeface="+mn-lt"/>
+              </a:rPr>
+              <a:t>Polars:</a:t>
+            </a:r>
+          </a:p>
+          <a:p>
+            <a:pPr marL="114300" indent="0" algn="l">
+              <a:buNone/>
+            </a:pPr>
+            <a:endParaRPr lang="en-US" sz="1600" b="0" i="0" dirty="0">
+              <a:solidFill>
+                <a:schemeClr val="tx1"/>
+              </a:solidFill>
+              <a:effectLst/>
+              <a:latin typeface="+mn-lt"/>
+            </a:endParaRPr>
+          </a:p>
+          <a:p>
+            <a:pPr marL="114300" indent="0" algn="l">
+              <a:buNone/>
+            </a:pPr>
+            <a:r>
+              <a:rPr lang="en-US" sz="1600" b="0" i="1" dirty="0">
+                <a:solidFill>
+                  <a:schemeClr val="tx1"/>
+                </a:solidFill>
+                <a:effectLst/>
+                <a:latin typeface="+mn-lt"/>
+              </a:rPr>
+              <a:t>Strengths</a:t>
+            </a:r>
+            <a:r>
+              <a:rPr lang="en-US" sz="1600" b="0" dirty="0">
+                <a:solidFill>
+                  <a:schemeClr val="tx1"/>
+                </a:solidFill>
+                <a:effectLst/>
+                <a:latin typeface="+mn-lt"/>
+              </a:rPr>
+              <a:t>: allow parallel execution and compared with Pandas has a 30x of speedup.</a:t>
+            </a:r>
+          </a:p>
+          <a:p>
+            <a:pPr marL="114300" indent="0" algn="l">
+              <a:buNone/>
+            </a:pPr>
+            <a:endParaRPr lang="en-US" sz="1600" b="0" i="1" dirty="0">
+              <a:solidFill>
+                <a:schemeClr val="tx1"/>
+              </a:solidFill>
+              <a:effectLst/>
+              <a:latin typeface="+mn-lt"/>
+            </a:endParaRPr>
+          </a:p>
+          <a:p>
+            <a:pPr marL="114300" indent="0" algn="l">
+              <a:buNone/>
+            </a:pPr>
+            <a:r>
+              <a:rPr lang="en-US" sz="1600" b="0" i="1" dirty="0">
+                <a:solidFill>
+                  <a:schemeClr val="tx1"/>
+                </a:solidFill>
+                <a:effectLst/>
+                <a:latin typeface="+mn-lt"/>
+              </a:rPr>
+              <a:t>Limitations</a:t>
+            </a:r>
+            <a:r>
+              <a:rPr lang="en-US" sz="1600" dirty="0">
+                <a:solidFill>
+                  <a:schemeClr val="tx1"/>
+                </a:solidFill>
+                <a:latin typeface="+mn-lt"/>
+              </a:rPr>
+              <a:t>:</a:t>
+            </a:r>
+            <a:r>
+              <a:rPr lang="en-US" sz="1600" b="0" dirty="0">
+                <a:solidFill>
+                  <a:schemeClr val="tx1"/>
+                </a:solidFill>
+                <a:effectLst/>
+                <a:latin typeface="+mn-lt"/>
+              </a:rPr>
+              <a:t> it is a very new library, so it has a good chance of further improving performance.</a:t>
+            </a:r>
+            <a:endParaRPr lang="it-IT" dirty="0"/>
+          </a:p>
+        </p:txBody>
+      </p:sp>
+    </p:spTree>
+    <p:extLst>
+      <p:ext uri="{BB962C8B-B14F-4D97-AF65-F5344CB8AC3E}">
+        <p14:creationId xmlns:p14="http://schemas.microsoft.com/office/powerpoint/2010/main" val="3280334191"/>
+      </p:ext>
+    </p:extLst>
+  </p:cSld>
+  <p:clrMapOvr>
+    <a:masterClrMapping/>
+  </p:clrMapOvr>
+</p:sld>
+</file>
+
+<file path=ppt/slides/slide18.xml><?xml version="1.0" encoding="utf-8"?>
+<p:sld xmlns:a="http://schemas.openxmlformats.org/drawingml/2006/main" xmlns:r="http://schemas.openxmlformats.org/officeDocument/2006/relationships" xmlns:p="http://schemas.openxmlformats.org/presentationml/2006/main">
+  <p:cSld>
     <p:bg>
       <p:bgPr>
         <a:solidFill>
@@ -11833,15 +12070,6 @@
 </file>
 
 <file path=customXml/item1.xml><?xml version="1.0" encoding="utf-8"?>
-<?mso-contentType ?>
-<FormTemplates xmlns="http://schemas.microsoft.com/sharepoint/v3/contenttype/forms">
-  <Display>DocumentLibraryForm</Display>
-  <Edit>DocumentLibraryForm</Edit>
-  <New>DocumentLibraryForm</New>
-</FormTemplates>
-</file>
-
-<file path=customXml/item2.xml><?xml version="1.0" encoding="utf-8"?>
 <ct:contentTypeSchema xmlns:ct="http://schemas.microsoft.com/office/2006/metadata/contentType" xmlns:ma="http://schemas.microsoft.com/office/2006/metadata/properties/metaAttributes" ct:_="" ma:_="" ma:contentTypeName="Document" ma:contentTypeID="0x01010044010DD6E8A765478ECC4B4EF4800ACC" ma:contentTypeVersion="13" ma:contentTypeDescription="Create a new document." ma:contentTypeScope="" ma:versionID="a4e063bae554e24e5443f55a738cb29a">
   <xsd:schema xmlns:xsd="http://www.w3.org/2001/XMLSchema" xmlns:xs="http://www.w3.org/2001/XMLSchema" xmlns:p="http://schemas.microsoft.com/office/2006/metadata/properties" xmlns:ns2="fd22e687-371b-414e-9e15-0f1095911aa6" xmlns:ns3="b0584e29-aeb5-4056-b862-c9e01aaf115a" targetNamespace="http://schemas.microsoft.com/office/2006/metadata/properties" ma:root="true" ma:fieldsID="a34d597af065eee0ceb38710a317da13" ns2:_="" ns3:_="">
     <xsd:import namespace="fd22e687-371b-414e-9e15-0f1095911aa6"/>
@@ -12064,15 +12292,16 @@
 </ct:contentTypeSchema>
 </file>
 
-<file path=customXml/itemProps1.xml><?xml version="1.0" encoding="utf-8"?>
-<ds:datastoreItem xmlns:ds="http://schemas.openxmlformats.org/officeDocument/2006/customXml" ds:itemID="{34CC30C9-2DDA-45A2-8096-27594D600213}">
-  <ds:schemaRefs>
-    <ds:schemaRef ds:uri="http://schemas.microsoft.com/sharepoint/v3/contenttype/forms"/>
-  </ds:schemaRefs>
-</ds:datastoreItem>
+<file path=customXml/item2.xml><?xml version="1.0" encoding="utf-8"?>
+<?mso-contentType ?>
+<FormTemplates xmlns="http://schemas.microsoft.com/sharepoint/v3/contenttype/forms">
+  <Display>DocumentLibraryForm</Display>
+  <Edit>DocumentLibraryForm</Edit>
+  <New>DocumentLibraryForm</New>
+</FormTemplates>
 </file>
 
-<file path=customXml/itemProps2.xml><?xml version="1.0" encoding="utf-8"?>
+<file path=customXml/itemProps1.xml><?xml version="1.0" encoding="utf-8"?>
 <ds:datastoreItem xmlns:ds="http://schemas.openxmlformats.org/officeDocument/2006/customXml" ds:itemID="{D91B5D6A-DB59-4B37-855C-02216C6CE879}">
   <ds:schemaRefs>
     <ds:schemaRef ds:uri="http://schemas.microsoft.com/office/2006/metadata/contentType"/>
@@ -12089,4 +12318,12 @@
     <ds:schemaRef ds:uri="http://schemas.microsoft.com/internal/obd"/>
   </ds:schemaRefs>
 </ds:datastoreItem>
+</file>
+
+<file path=customXml/itemProps2.xml><?xml version="1.0" encoding="utf-8"?>
+<ds:datastoreItem xmlns:ds="http://schemas.openxmlformats.org/officeDocument/2006/customXml" ds:itemID="{34CC30C9-2DDA-45A2-8096-27594D600213}">
+  <ds:schemaRefs>
+    <ds:schemaRef ds:uri="http://schemas.microsoft.com/sharepoint/v3/contenttype/forms"/>
+  </ds:schemaRefs>
+</ds:datastoreItem>
 </file>
</xml_diff>